<commit_message>
Finished Module 7, profiling
</commit_message>
<xml_diff>
--- a/docs/PTD01 Python for Tool Developers module 1 v0.1.pptx
+++ b/docs/PTD01 Python for Tool Developers module 1 v0.1.pptx
@@ -212,7 +212,7 @@
           <a:bodyPr lIns="0" rIns="0" tIns="0" bIns="0" anchor="b"/>
           <a:p>
             <a:pPr algn="r"/>
-            <a:fld id="{747C28CF-7708-43C2-9435-A119230F2C85}" type="slidenum">
+            <a:fld id="{8D390E7B-19F0-44E0-80AA-FDC0A7A2BA42}" type="slidenum">
               <a:rPr lang="en-IN" sz="1400">
                 <a:latin typeface="Times New Roman"/>
               </a:rPr>
@@ -331,7 +331,7 @@
                 <a:spcPct val="100000"/>
               </a:lnSpc>
             </a:pPr>
-            <a:fld id="{208A4A9D-B123-4057-B8E6-CD3D87654815}" type="slidenum">
+            <a:fld id="{3FFCCAD2-19E1-4E57-BDB2-8016E8EFD102}" type="slidenum">
               <a:rPr lang="en-IN" sz="1000">
                 <a:solidFill>
                   <a:srgbClr val="000000"/>
@@ -704,7 +704,7 @@
                 <a:spcPct val="100000"/>
               </a:lnSpc>
             </a:pPr>
-            <a:fld id="{A07C535D-3950-4778-847B-C3EDF9ED384B}" type="slidenum">
+            <a:fld id="{2D05A06F-3057-46BB-85B7-5EFA19CFBB95}" type="slidenum">
               <a:rPr lang="en-IN" sz="1000">
                 <a:solidFill>
                   <a:srgbClr val="000000"/>
@@ -965,7 +965,7 @@
                 <a:spcPct val="100000"/>
               </a:lnSpc>
             </a:pPr>
-            <a:fld id="{CB951445-3DCD-4296-92D6-E2C6A3E6FC62}" type="slidenum">
+            <a:fld id="{E82EC1E9-7E9F-4B5E-A83B-8E62C2FD5F2C}" type="slidenum">
               <a:rPr lang="en-IN" sz="1000">
                 <a:solidFill>
                   <a:srgbClr val="000000"/>
@@ -1900,7 +1900,7 @@
                 <a:spcPct val="100000"/>
               </a:lnSpc>
             </a:pPr>
-            <a:fld id="{2696716A-E13B-4AA6-9DF1-C8DCC7EE7DB4}" type="slidenum">
+            <a:fld id="{26986118-FE16-4843-9ED1-65AD9624E420}" type="slidenum">
               <a:rPr lang="en-IN" sz="1000">
                 <a:solidFill>
                   <a:srgbClr val="000000"/>
@@ -2486,7 +2486,7 @@
                 <a:spcPct val="100000"/>
               </a:lnSpc>
             </a:pPr>
-            <a:fld id="{0DC0D076-322D-4991-92C3-62707D1DA6C2}" type="slidenum">
+            <a:fld id="{DEE8BF04-83A6-49CC-A5CA-013E601388F2}" type="slidenum">
               <a:rPr lang="en-IN" sz="1000">
                 <a:solidFill>
                   <a:srgbClr val="000000"/>
@@ -3301,7 +3301,7 @@
                 <a:spcPct val="100000"/>
               </a:lnSpc>
             </a:pPr>
-            <a:fld id="{8939756C-940A-40B3-B986-08FD0E7257AA}" type="slidenum">
+            <a:fld id="{B375B0A6-ED8C-4B90-A5F5-E57905F843CD}" type="slidenum">
               <a:rPr lang="en-IN" sz="1000">
                 <a:solidFill>
                   <a:srgbClr val="000000"/>
@@ -4029,7 +4029,7 @@
                 <a:spcPct val="100000"/>
               </a:lnSpc>
             </a:pPr>
-            <a:fld id="{2EE99BEB-0052-4477-9549-8EFAF4D71006}" type="slidenum">
+            <a:fld id="{8A4B9C39-0DCE-42E9-923A-B6B35DF04141}" type="slidenum">
               <a:rPr lang="en-IN" sz="1000">
                 <a:solidFill>
                   <a:srgbClr val="000000"/>
@@ -4589,7 +4589,7 @@
                 <a:spcPct val="100000"/>
               </a:lnSpc>
             </a:pPr>
-            <a:fld id="{0AD84D5F-DC85-4766-8F7F-B69D25395C53}" type="slidenum">
+            <a:fld id="{02946A23-40C4-4BA0-9AE9-3CF83EE05693}" type="slidenum">
               <a:rPr lang="en-IN" sz="1000">
                 <a:solidFill>
                   <a:srgbClr val="000000"/>
@@ -5089,7 +5089,7 @@
                 <a:spcPct val="100000"/>
               </a:lnSpc>
             </a:pPr>
-            <a:fld id="{2C85BED1-D7E2-454E-A326-8E8CEE2C79F8}" type="slidenum">
+            <a:fld id="{DE5576D3-6CEF-4524-BD0A-63B4592CE07F}" type="slidenum">
               <a:rPr lang="en-IN" sz="1000">
                 <a:solidFill>
                   <a:srgbClr val="000000"/>
@@ -5712,7 +5712,7 @@
                 <a:spcPct val="100000"/>
               </a:lnSpc>
             </a:pPr>
-            <a:fld id="{2181E6D6-834B-4EE2-88D8-A2757774EE89}" type="slidenum">
+            <a:fld id="{92AEAA50-D719-465A-850D-45CF7E9F52D6}" type="slidenum">
               <a:rPr lang="en-IN" sz="1000">
                 <a:solidFill>
                   <a:srgbClr val="000000"/>
@@ -6027,7 +6027,7 @@
                 <a:spcPct val="100000"/>
               </a:lnSpc>
             </a:pPr>
-            <a:fld id="{2B9FBD19-B75A-4716-8F39-0863643CED6A}" type="slidenum">
+            <a:fld id="{2AE3F2C7-2A09-47C2-BF85-076BC96A424E}" type="slidenum">
               <a:rPr lang="en-IN" sz="1000">
                 <a:solidFill>
                   <a:srgbClr val="000000"/>
@@ -6691,7 +6691,7 @@
                 <a:spcPct val="100000"/>
               </a:lnSpc>
             </a:pPr>
-            <a:fld id="{76630D79-50EF-41FE-8726-574BCECD6F89}" type="slidenum">
+            <a:fld id="{F2193294-89F4-4EDC-A91E-2D4611821BAA}" type="slidenum">
               <a:rPr lang="en-IN" sz="1000">
                 <a:solidFill>
                   <a:srgbClr val="000000"/>
@@ -7006,7 +7006,7 @@
                 <a:spcPct val="100000"/>
               </a:lnSpc>
             </a:pPr>
-            <a:fld id="{98509374-746E-44D5-930A-E246B7804A2C}" type="slidenum">
+            <a:fld id="{F530E17C-D215-48D3-9C88-3B7973BF9286}" type="slidenum">
               <a:rPr lang="en-IN" sz="1000">
                 <a:solidFill>
                   <a:srgbClr val="000000"/>
@@ -7878,7 +7878,7 @@
                 <a:spcPct val="100000"/>
               </a:lnSpc>
             </a:pPr>
-            <a:fld id="{F9AF6B42-EF67-488A-A5A1-ED11C691A560}" type="slidenum">
+            <a:fld id="{4B3D2527-F48B-491D-BDA8-41C17F228341}" type="slidenum">
               <a:rPr lang="en-IN" sz="1000">
                 <a:solidFill>
                   <a:srgbClr val="000000"/>
@@ -8985,7 +8985,7 @@
                 <a:spcPct val="100000"/>
               </a:lnSpc>
             </a:pPr>
-            <a:fld id="{7A618726-D18D-4E2A-87DE-DC51A0A8D2BE}" type="slidenum">
+            <a:fld id="{A999FD37-12B8-40BD-9F53-F98A069044B7}" type="slidenum">
               <a:rPr lang="en-IN" sz="1000">
                 <a:solidFill>
                   <a:srgbClr val="000000"/>
@@ -9842,7 +9842,7 @@
                 <a:spcPct val="100000"/>
               </a:lnSpc>
             </a:pPr>
-            <a:fld id="{63F21FE5-6549-4949-ACC6-D79B7B64AAAB}" type="slidenum">
+            <a:fld id="{02C30DF4-54D1-46D1-9192-492D8E881BBA}" type="slidenum">
               <a:rPr lang="en-IN" sz="1000">
                 <a:solidFill>
                   <a:srgbClr val="000000"/>
@@ -10699,7 +10699,7 @@
                 <a:spcPct val="100000"/>
               </a:lnSpc>
             </a:pPr>
-            <a:fld id="{E2C041A9-0FC6-43C1-B366-A01D1331F1AE}" type="slidenum">
+            <a:fld id="{987AF33D-165B-4361-9539-C75753CE2A75}" type="slidenum">
               <a:rPr lang="en-IN" sz="1000">
                 <a:solidFill>
                   <a:srgbClr val="000000"/>
@@ -11625,7 +11625,7 @@
                 <a:spcPct val="100000"/>
               </a:lnSpc>
             </a:pPr>
-            <a:fld id="{593083AC-9236-4613-A87D-16AA88B295A3}" type="slidenum">
+            <a:fld id="{BBB9295A-ED18-41EF-A4F5-A8FD69A0E22C}" type="slidenum">
               <a:rPr lang="en-IN" sz="1000">
                 <a:solidFill>
                   <a:srgbClr val="000000"/>
@@ -12009,7 +12009,7 @@
                 <a:spcPct val="100000"/>
               </a:lnSpc>
             </a:pPr>
-            <a:fld id="{5637286C-B00A-477A-BF31-9FBCA9F08FE5}" type="slidenum">
+            <a:fld id="{5991B6C2-3444-41F9-9AC4-0B0EB83DBE60}" type="slidenum">
               <a:rPr lang="en-IN" sz="1000">
                 <a:solidFill>
                   <a:srgbClr val="000000"/>
@@ -12393,7 +12393,7 @@
                 <a:spcPct val="100000"/>
               </a:lnSpc>
             </a:pPr>
-            <a:fld id="{F2FBDA43-0973-420A-ABF4-953B7086739F}" type="slidenum">
+            <a:fld id="{6C6E0C75-C9FE-4897-B0AA-4E1D29FE255A}" type="slidenum">
               <a:rPr lang="en-IN" sz="1000">
                 <a:solidFill>
                   <a:srgbClr val="000000"/>
@@ -12777,7 +12777,7 @@
                 <a:spcPct val="100000"/>
               </a:lnSpc>
             </a:pPr>
-            <a:fld id="{02647146-4F71-42E6-9874-2B6F281D7816}" type="slidenum">
+            <a:fld id="{779E5A20-B812-46C0-AFCD-398A5E17A333}" type="slidenum">
               <a:rPr lang="en-IN" sz="1000">
                 <a:solidFill>
                   <a:srgbClr val="000000"/>
@@ -12899,7 +12899,7 @@
                 <a:spcPct val="100000"/>
               </a:lnSpc>
             </a:pPr>
-            <a:fld id="{9FD6826F-7381-4BC5-9C4F-9F3094D33E02}" type="slidenum">
+            <a:fld id="{35246391-4904-47CA-9D44-D2369298080C}" type="slidenum">
               <a:rPr lang="en-IN" sz="1000">
                 <a:solidFill>
                   <a:srgbClr val="000000"/>
@@ -13255,7 +13255,7 @@
                 <a:spcPct val="100000"/>
               </a:lnSpc>
             </a:pPr>
-            <a:fld id="{E7991528-2077-4F84-8755-78F583ABD4FC}" type="slidenum">
+            <a:fld id="{92861109-17C4-4521-ADA4-7378E6EAFB7B}" type="slidenum">
               <a:rPr lang="en-IN" sz="1000">
                 <a:solidFill>
                   <a:srgbClr val="000000"/>
@@ -13635,7 +13635,7 @@
                 <a:spcPct val="100000"/>
               </a:lnSpc>
             </a:pPr>
-            <a:fld id="{37CF829F-EBDF-4EF0-AEE4-0D2D971FA09A}" type="slidenum">
+            <a:fld id="{3504F806-DBBC-4861-AB62-B242F2C5BEEF}" type="slidenum">
               <a:rPr lang="en-IN" sz="1000">
                 <a:solidFill>
                   <a:srgbClr val="000000"/>
@@ -14055,7 +14055,7 @@
                 <a:spcPct val="100000"/>
               </a:lnSpc>
             </a:pPr>
-            <a:fld id="{DAB50CF0-C9C0-4A0E-9831-23BD9AE45857}" type="slidenum">
+            <a:fld id="{45C59338-27E2-485E-909A-A9DA2F4F3AF4}" type="slidenum">
               <a:rPr lang="en-IN" sz="1000">
                 <a:solidFill>
                   <a:srgbClr val="000000"/>
@@ -14537,7 +14537,7 @@
                 <a:spcPct val="100000"/>
               </a:lnSpc>
             </a:pPr>
-            <a:fld id="{974838E8-2E8E-4490-BDC7-9B4B73850254}" type="slidenum">
+            <a:fld id="{FE6E91AC-4839-4686-BDC2-32E6CAD64328}" type="slidenum">
               <a:rPr lang="en-IN" sz="1000">
                 <a:solidFill>
                   <a:srgbClr val="000000"/>
@@ -15018,7 +15018,7 @@
                 <a:spcPct val="100000"/>
               </a:lnSpc>
             </a:pPr>
-            <a:fld id="{BF93BFCE-AE29-4756-A4ED-42771B565497}" type="slidenum">
+            <a:fld id="{7AC80411-6D99-40CC-AFFA-7F3254C41A87}" type="slidenum">
               <a:rPr lang="en-IN" sz="1000">
                 <a:solidFill>
                   <a:srgbClr val="000000"/>
@@ -15593,7 +15593,7 @@
                 <a:spcPct val="100000"/>
               </a:lnSpc>
             </a:pPr>
-            <a:fld id="{EE9CF4BD-34B7-41E6-B336-45ABFA808CEB}" type="slidenum">
+            <a:fld id="{85CFAF67-8CFF-4B0A-86BC-54AC7906DE89}" type="slidenum">
               <a:rPr lang="en-IN" sz="1000">
                 <a:solidFill>
                   <a:srgbClr val="000000"/>
@@ -18271,7 +18271,7 @@
                 <a:spcPct val="100000"/>
               </a:lnSpc>
             </a:pPr>
-            <a:fld id="{80EDD7AA-6D73-4CCA-B8E7-D1F7C4DF3CA6}" type="slidenum">
+            <a:fld id="{98EA7638-6E4A-48BC-AD63-5C6AB67E0F79}" type="slidenum">
               <a:rPr lang="en-IN" sz="1200">
                 <a:solidFill>
                   <a:srgbClr val="8b8b8b"/>
@@ -19239,7 +19239,7 @@
                 <a:spcPct val="100000"/>
               </a:lnSpc>
             </a:pPr>
-            <a:fld id="{6F2E4620-1E3C-47B8-8B0F-8285220F25CB}" type="slidenum">
+            <a:fld id="{24A83E30-56BD-40D8-9016-883E5E55D08F}" type="slidenum">
               <a:rPr lang="en-IN" sz="1200">
                 <a:solidFill>
                   <a:srgbClr val="000000"/>
@@ -19531,7 +19531,7 @@
                 <a:spcPct val="100000"/>
               </a:lnSpc>
             </a:pPr>
-            <a:fld id="{C3CB4E35-69AA-47B0-B7B3-4D98EFD2AE5E}" type="slidenum">
+            <a:fld id="{C7583B6D-9147-4942-A285-FAC5ECF858F5}" type="slidenum">
               <a:rPr lang="en-IN" sz="1200">
                 <a:solidFill>
                   <a:srgbClr val="000000"/>
@@ -19823,7 +19823,7 @@
                 <a:spcPct val="100000"/>
               </a:lnSpc>
             </a:pPr>
-            <a:fld id="{832BBCCA-09B2-422E-824C-23A39888F665}" type="slidenum">
+            <a:fld id="{1FFC6B92-87F8-4092-80DC-6F883AD29FB8}" type="slidenum">
               <a:rPr lang="en-IN" sz="1200">
                 <a:solidFill>
                   <a:srgbClr val="000000"/>
@@ -20205,7 +20205,7 @@
                 <a:spcPct val="100000"/>
               </a:lnSpc>
             </a:pPr>
-            <a:fld id="{B52DF4AF-FFCD-4103-8ACE-D4C76BD8BA1E}" type="slidenum">
+            <a:fld id="{A070874D-7234-470C-BA78-46844F7A0F39}" type="slidenum">
               <a:rPr lang="en-IN" sz="1200">
                 <a:solidFill>
                   <a:srgbClr val="000000"/>
@@ -20587,7 +20587,7 @@
                 <a:spcPct val="100000"/>
               </a:lnSpc>
             </a:pPr>
-            <a:fld id="{62F0FFDB-3AE6-40AD-995B-9665A89FE663}" type="slidenum">
+            <a:fld id="{A058D789-C2DE-439A-88BF-43439AA92F7B}" type="slidenum">
               <a:rPr lang="en-IN" sz="1200">
                 <a:solidFill>
                   <a:srgbClr val="000000"/>
@@ -20969,7 +20969,7 @@
                 <a:spcPct val="100000"/>
               </a:lnSpc>
             </a:pPr>
-            <a:fld id="{727C8BC9-7C2E-4FCD-AC84-7C60E290BB57}" type="slidenum">
+            <a:fld id="{A2980C95-87D4-455B-8081-9741B211CC4A}" type="slidenum">
               <a:rPr lang="en-IN" sz="1200">
                 <a:solidFill>
                   <a:srgbClr val="000000"/>
@@ -21349,7 +21349,7 @@
                 <a:spcPct val="100000"/>
               </a:lnSpc>
             </a:pPr>
-            <a:fld id="{15DDE404-075E-494B-97A8-16986B41B211}" type="slidenum">
+            <a:fld id="{D1755AF9-217D-424B-808B-DDCC564BDAA1}" type="slidenum">
               <a:rPr lang="en-IN" sz="1200">
                 <a:solidFill>
                   <a:srgbClr val="000000"/>
@@ -21724,7 +21724,7 @@
                 <a:spcPct val="100000"/>
               </a:lnSpc>
             </a:pPr>
-            <a:fld id="{0E3083FA-C669-410E-8797-42307ED6E54A}" type="slidenum">
+            <a:fld id="{2E7A4912-608B-4C28-A787-519827B88395}" type="slidenum">
               <a:rPr lang="en-IN" sz="1200">
                 <a:solidFill>
                   <a:srgbClr val="000000"/>
@@ -22099,7 +22099,7 @@
                 <a:spcPct val="100000"/>
               </a:lnSpc>
             </a:pPr>
-            <a:fld id="{767D38EA-43D8-4E64-9870-B0E7143C9F68}" type="slidenum">
+            <a:fld id="{642395FA-9DF4-46F3-A68B-75973AFDCE21}" type="slidenum">
               <a:rPr lang="en-IN" sz="1200">
                 <a:solidFill>
                   <a:srgbClr val="000000"/>
@@ -22401,7 +22401,7 @@
                 <a:spcPct val="100000"/>
               </a:lnSpc>
             </a:pPr>
-            <a:fld id="{44872870-6E5E-4EBA-A3A4-F23C0A7F3DCF}" type="slidenum">
+            <a:fld id="{46CE4355-72FE-4F98-930A-D9FE39053238}" type="slidenum">
               <a:rPr lang="en-IN" sz="1200">
                 <a:solidFill>
                   <a:srgbClr val="000000"/>
@@ -22722,7 +22722,7 @@
                 <a:spcPct val="100000"/>
               </a:lnSpc>
             </a:pPr>
-            <a:fld id="{28BD1684-AE4E-44A8-B9BF-2CCFAFA5A9D6}" type="slidenum">
+            <a:fld id="{DE3F7E1E-A204-4675-B20D-1F592CA1250E}" type="slidenum">
               <a:rPr lang="en-IN" sz="1200">
                 <a:solidFill>
                   <a:srgbClr val="000000"/>
@@ -23034,7 +23034,7 @@
                 <a:spcPct val="100000"/>
               </a:lnSpc>
             </a:pPr>
-            <a:fld id="{04DC7DDE-5EC6-45D5-AA0F-3C425DD041A0}" type="slidenum">
+            <a:fld id="{BF97A704-A0D0-4237-BEC6-5CF04D65AF4F}" type="slidenum">
               <a:rPr lang="en-IN" sz="1200">
                 <a:solidFill>
                   <a:srgbClr val="000000"/>
@@ -23286,7 +23286,7 @@
                 <a:spcPct val="100000"/>
               </a:lnSpc>
             </a:pPr>
-            <a:fld id="{FAD8C685-6ECA-4201-8822-75D480CD1F2A}" type="slidenum">
+            <a:fld id="{C00A3119-1937-423A-A075-D91D591E4B9A}" type="slidenum">
               <a:rPr lang="en-IN" sz="1200">
                 <a:solidFill>
                   <a:srgbClr val="000000"/>
@@ -24115,7 +24115,7 @@
                 <a:spcPct val="100000"/>
               </a:lnSpc>
             </a:pPr>
-            <a:fld id="{551613CB-6094-4CBA-BCA8-84C4FEDB35DB}" type="slidenum">
+            <a:fld id="{04289AFE-3FA0-4E3A-859C-1C74CF83A8BE}" type="slidenum">
               <a:rPr lang="en-IN" sz="1200">
                 <a:solidFill>
                   <a:srgbClr val="000000"/>
@@ -24530,7 +24530,7 @@
                 <a:spcPct val="100000"/>
               </a:lnSpc>
             </a:pPr>
-            <a:fld id="{D4431E3A-ABB7-4FA7-A407-A41B8E691A20}" type="slidenum">
+            <a:fld id="{C677A7DA-3F4D-4F59-A6DA-83D8C110814C}" type="slidenum">
               <a:rPr lang="en-IN" sz="1200">
                 <a:solidFill>
                   <a:srgbClr val="000000"/>
@@ -24912,7 +24912,7 @@
                 <a:spcPct val="100000"/>
               </a:lnSpc>
             </a:pPr>
-            <a:fld id="{9AA04367-D491-4EE9-9225-67C65B010633}" type="slidenum">
+            <a:fld id="{EA039E81-80F5-4D3D-B53F-F40E73733D72}" type="slidenum">
               <a:rPr lang="en-IN" sz="1200">
                 <a:solidFill>
                   <a:srgbClr val="000000"/>
@@ -25367,7 +25367,7 @@
                 <a:spcPct val="100000"/>
               </a:lnSpc>
             </a:pPr>
-            <a:fld id="{DC962814-AB71-4904-A376-6BA06F08CA6A}" type="slidenum">
+            <a:fld id="{66687B2F-8ADD-4626-8826-80194F40D86A}" type="slidenum">
               <a:rPr lang="en-IN" sz="1200">
                 <a:solidFill>
                   <a:srgbClr val="000000"/>
@@ -25595,7 +25595,7 @@
                 <a:spcPct val="100000"/>
               </a:lnSpc>
             </a:pPr>
-            <a:fld id="{453BB52C-9FBE-4753-B7C7-B1070AA79C5B}" type="slidenum">
+            <a:fld id="{DF00B9D9-FB68-462C-8A54-D5A4631D10D0}" type="slidenum">
               <a:rPr lang="en-IN" sz="1200">
                 <a:solidFill>
                   <a:srgbClr val="000000"/>
@@ -26069,7 +26069,7 @@
                 <a:spcPct val="100000"/>
               </a:lnSpc>
             </a:pPr>
-            <a:fld id="{41104BAA-A107-4CE7-A96A-D656F606AA62}" type="slidenum">
+            <a:fld id="{80F3E1A8-E6E7-48FD-A109-76390E2AA51B}" type="slidenum">
               <a:rPr lang="en-IN" sz="1200">
                 <a:solidFill>
                   <a:srgbClr val="000000"/>
@@ -26603,7 +26603,7 @@
                 <a:spcPct val="100000"/>
               </a:lnSpc>
             </a:pPr>
-            <a:fld id="{95457488-FC80-459D-B0D7-19BE74F49DA9}" type="slidenum">
+            <a:fld id="{AF95F538-64EE-4051-8C73-0D3BFECBB700}" type="slidenum">
               <a:rPr lang="en-IN" sz="1200">
                 <a:solidFill>
                   <a:srgbClr val="000000"/>
@@ -26764,7 +26764,7 @@
                 <a:spcPct val="100000"/>
               </a:lnSpc>
             </a:pPr>
-            <a:fld id="{56989B8E-B1EE-4E8D-B50E-062B88373A10}" type="slidenum">
+            <a:fld id="{E55FA6BC-6E9D-4AF8-8DFC-630F64A2741B}" type="slidenum">
               <a:rPr lang="en-IN" sz="1200">
                 <a:solidFill>
                   <a:srgbClr val="000000"/>
@@ -27259,7 +27259,7 @@
                 <a:spcPct val="100000"/>
               </a:lnSpc>
             </a:pPr>
-            <a:fld id="{1C37382A-52E9-4FBF-855C-A18C616E140B}" type="slidenum">
+            <a:fld id="{52C99A23-760D-4805-B6C0-1793F9DC16F3}" type="slidenum">
               <a:rPr lang="en-IN" sz="1200">
                 <a:solidFill>
                   <a:srgbClr val="000000"/>
@@ -27754,7 +27754,7 @@
                 <a:spcPct val="100000"/>
               </a:lnSpc>
             </a:pPr>
-            <a:fld id="{2DF8E56C-ADCC-4C45-B0C9-E7CDCEF68618}" type="slidenum">
+            <a:fld id="{03B95BB5-E3A7-46E7-AED7-EBF21166D375}" type="slidenum">
               <a:rPr lang="en-IN" sz="1200">
                 <a:solidFill>
                   <a:srgbClr val="000000"/>
@@ -28167,7 +28167,7 @@
                 <a:spcPct val="100000"/>
               </a:lnSpc>
             </a:pPr>
-            <a:fld id="{DB2B1E07-9731-41BE-91FF-902CAF4EE931}" type="slidenum">
+            <a:fld id="{E062F212-EC51-4F87-B534-F3B507A69488}" type="slidenum">
               <a:rPr lang="en-IN" sz="1200">
                 <a:solidFill>
                   <a:srgbClr val="000000"/>
@@ -28495,7 +28495,7 @@
                 <a:spcPct val="100000"/>
               </a:lnSpc>
             </a:pPr>
-            <a:fld id="{24069A29-10F7-4880-8856-4D15A3BC20EF}" type="slidenum">
+            <a:fld id="{B9D4A8F4-5BF8-44FE-AA27-5F199B36A043}" type="slidenum">
               <a:rPr lang="en-IN" sz="1200">
                 <a:solidFill>
                   <a:srgbClr val="000000"/>
@@ -28823,7 +28823,7 @@
                 <a:spcPct val="100000"/>
               </a:lnSpc>
             </a:pPr>
-            <a:fld id="{EE5B6D21-DB34-4C5B-B744-CF5CD64B2E38}" type="slidenum">
+            <a:fld id="{8A139534-25D9-489C-A926-7551CD294B37}" type="slidenum">
               <a:rPr lang="en-IN" sz="1200">
                 <a:solidFill>
                   <a:srgbClr val="000000"/>
@@ -29285,7 +29285,7 @@
                 <a:spcPct val="100000"/>
               </a:lnSpc>
             </a:pPr>
-            <a:fld id="{ADDBBEB5-5B99-4B24-992A-28DC52490583}" type="slidenum">
+            <a:fld id="{595FDF96-7885-4047-A9CC-49182F4D4350}" type="slidenum">
               <a:rPr lang="en-IN" sz="1200">
                 <a:solidFill>
                   <a:srgbClr val="000000"/>

</xml_diff>